<commit_message>
Präsentation Zusammengetragen + pdf
</commit_message>
<xml_diff>
--- a/Präsentation/Motivation.pptx
+++ b/Präsentation/Motivation.pptx
@@ -196,7 +196,7 @@
           <a:p>
             <a:fld id="{E0BBD6D1-079B-4A4C-A131-8D5BE29A1F20}" type="datetimeFigureOut">
               <a:rPr lang="de-DE" smtClean="0"/>
-              <a:t>25.09.2014</a:t>
+              <a:t>26.09.2014</a:t>
             </a:fld>
             <a:endParaRPr lang="de-DE"/>
           </a:p>
@@ -5866,6 +5866,47 @@
           </a:p>
         </p:txBody>
       </p:sp>
+      <p:pic>
+        <p:nvPicPr>
+          <p:cNvPr id="1026" name="Picture 2" descr="C:\Users\AlexW\Documents\GitHub\Documents\pflichtenheft\bilder\Logo-ROS.png"/>
+          <p:cNvPicPr>
+            <a:picLocks noChangeAspect="1" noChangeArrowheads="1"/>
+          </p:cNvPicPr>
+          <p:nvPr/>
+        </p:nvPicPr>
+        <p:blipFill>
+          <a:blip r:embed="rId3">
+            <a:extLst>
+              <a:ext uri="{28A0092B-C50C-407E-A947-70E740481C1C}">
+                <a14:useLocalDpi xmlns:a14="http://schemas.microsoft.com/office/drawing/2010/main" val="0"/>
+              </a:ext>
+            </a:extLst>
+          </a:blip>
+          <a:srcRect/>
+          <a:stretch>
+            <a:fillRect/>
+          </a:stretch>
+        </p:blipFill>
+        <p:spPr bwMode="auto">
+          <a:xfrm>
+            <a:off x="5144941" y="5085184"/>
+            <a:ext cx="3846443" cy="901510"/>
+          </a:xfrm>
+          <a:prstGeom prst="rect">
+            <a:avLst/>
+          </a:prstGeom>
+          <a:noFill/>
+          <a:extLst>
+            <a:ext uri="{909E8E84-426E-40DD-AFC4-6F175D3DCCD1}">
+              <a14:hiddenFill xmlns:a14="http://schemas.microsoft.com/office/drawing/2010/main">
+                <a:solidFill>
+                  <a:srgbClr val="FFFFFF"/>
+                </a:solidFill>
+              </a14:hiddenFill>
+            </a:ext>
+          </a:extLst>
+        </p:spPr>
+      </p:pic>
     </p:spTree>
     <p:extLst>
       <p:ext uri="{BB962C8B-B14F-4D97-AF65-F5344CB8AC3E}">

</xml_diff>